<commit_message>
Analytics course Numpy lesson
Main NumPy operations
</commit_message>
<xml_diff>
--- a/Analytics/08 - Библиотека Numpy/08 - Библиотека Numpy.pptx
+++ b/Analytics/08 - Библиотека Numpy/08 - Библиотека Numpy.pptx
@@ -234,7 +234,7 @@
           <a:p>
             <a:fld id="{929D4DEE-AA18-4B6A-845C-60AFD9463AA2}" type="datetimeFigureOut">
               <a:rPr lang="ru-RU" smtClean="0"/>
-              <a:t>20.11.2023</a:t>
+              <a:t>21.11.2023</a:t>
             </a:fld>
             <a:endParaRPr lang="ru-RU"/>
           </a:p>
@@ -1911,7 +1911,7 @@
           <a:p>
             <a:fld id="{1D8BD707-D9CF-40AE-B4C6-C98DA3205C09}" type="datetimeFigureOut">
               <a:rPr lang="en-US"/>
-              <a:t>11/20/23</a:t>
+              <a:t>11/21/23</a:t>
             </a:fld>
             <a:endParaRPr lang="en-US"/>
           </a:p>
@@ -2086,7 +2086,7 @@
           <a:p>
             <a:fld id="{1D8BD707-D9CF-40AE-B4C6-C98DA3205C09}" type="datetimeFigureOut">
               <a:rPr lang="en-US"/>
-              <a:t>11/20/23</a:t>
+              <a:t>11/21/23</a:t>
             </a:fld>
             <a:endParaRPr lang="en-US"/>
           </a:p>
@@ -2342,7 +2342,7 @@
           <a:p>
             <a:fld id="{1D8BD707-D9CF-40AE-B4C6-C98DA3205C09}" type="datetimeFigureOut">
               <a:rPr lang="en-US"/>
-              <a:t>11/20/23</a:t>
+              <a:t>11/21/23</a:t>
             </a:fld>
             <a:endParaRPr lang="en-US"/>
           </a:p>
@@ -2520,7 +2520,7 @@
           <a:p>
             <a:fld id="{1D8BD707-D9CF-40AE-B4C6-C98DA3205C09}" type="datetimeFigureOut">
               <a:rPr lang="en-US"/>
-              <a:t>11/20/23</a:t>
+              <a:t>11/21/23</a:t>
             </a:fld>
             <a:endParaRPr lang="en-US"/>
           </a:p>
@@ -2639,7 +2639,7 @@
           <a:p>
             <a:fld id="{1D8BD707-D9CF-40AE-B4C6-C98DA3205C09}" type="datetimeFigureOut">
               <a:rPr lang="en-US"/>
-              <a:t>11/20/23</a:t>
+              <a:t>11/21/23</a:t>
             </a:fld>
             <a:endParaRPr lang="en-US"/>
           </a:p>
@@ -5340,7 +5340,7 @@
           <a:p>
             <a:fld id="{1D8BD707-D9CF-40AE-B4C6-C98DA3205C09}" type="datetimeFigureOut">
               <a:rPr lang="en-US"/>
-              <a:t>11/20/23</a:t>
+              <a:t>11/21/23</a:t>
             </a:fld>
             <a:endParaRPr lang="en-US"/>
           </a:p>
@@ -14126,7 +14126,45 @@
               <a:buSzPts val="1300"/>
               <a:buAutoNum type="arabicPeriod"/>
             </a:pPr>
+            <a:endParaRPr lang="en-US" sz="1900" b="1" dirty="0"/>
+          </a:p>
+          <a:p>
+            <a:pPr marL="457200" indent="-311150" algn="l" rtl="0">
+              <a:lnSpc>
+                <a:spcPct val="100000"/>
+              </a:lnSpc>
+              <a:buSzPts val="1300"/>
+              <a:buAutoNum type="arabicPeriod"/>
+            </a:pPr>
+            <a:r>
+              <a:rPr lang="ru-RU" sz="1900" b="1" dirty="0"/>
+              <a:t>Учебные задачи на </a:t>
+            </a:r>
+            <a:r>
+              <a:rPr lang="en-US" sz="1900" b="1" dirty="0"/>
+              <a:t>NumPy</a:t>
+            </a:r>
             <a:endParaRPr lang="ru-RU" sz="1900" b="1" dirty="0"/>
+          </a:p>
+          <a:p>
+            <a:pPr marL="914400" lvl="1" indent="-311150" algn="l" rtl="0">
+              <a:lnSpc>
+                <a:spcPct val="100000"/>
+              </a:lnSpc>
+              <a:buSzPts val="1300"/>
+              <a:buFont typeface="Arial" panose="020B0604020202020204" pitchFamily="34" charset="0"/>
+              <a:buChar char="•"/>
+            </a:pPr>
+            <a:r>
+              <a:rPr lang="en-US" sz="1300" dirty="0">
+                <a:hlinkClick r:id="rId6"/>
+              </a:rPr>
+              <a:t>https://pythonworld.ru/numpy/100-exercises.html</a:t>
+            </a:r>
+            <a:r>
+              <a:rPr lang="ru-RU" sz="1300" dirty="0"/>
+              <a:t> </a:t>
+            </a:r>
           </a:p>
           <a:p>
             <a:pPr marL="457200" indent="-311150" algn="l" rtl="0">

</xml_diff>

<commit_message>
Analytics NumPy and PPO-TD3 in RL
</commit_message>
<xml_diff>
--- a/Analytics/08 - Библиотека Numpy/08 - Библиотека Numpy.pptx
+++ b/Analytics/08 - Библиотека Numpy/08 - Библиотека Numpy.pptx
@@ -234,7 +234,7 @@
           <a:p>
             <a:fld id="{929D4DEE-AA18-4B6A-845C-60AFD9463AA2}" type="datetimeFigureOut">
               <a:rPr lang="ru-RU" smtClean="0"/>
-              <a:t>21.11.2023</a:t>
+              <a:t>29.07.2024</a:t>
             </a:fld>
             <a:endParaRPr lang="ru-RU"/>
           </a:p>
@@ -1911,7 +1911,7 @@
           <a:p>
             <a:fld id="{1D8BD707-D9CF-40AE-B4C6-C98DA3205C09}" type="datetimeFigureOut">
               <a:rPr lang="en-US"/>
-              <a:t>11/21/23</a:t>
+              <a:t>7/29/24</a:t>
             </a:fld>
             <a:endParaRPr lang="en-US"/>
           </a:p>
@@ -2086,7 +2086,7 @@
           <a:p>
             <a:fld id="{1D8BD707-D9CF-40AE-B4C6-C98DA3205C09}" type="datetimeFigureOut">
               <a:rPr lang="en-US"/>
-              <a:t>11/21/23</a:t>
+              <a:t>7/29/24</a:t>
             </a:fld>
             <a:endParaRPr lang="en-US"/>
           </a:p>
@@ -2342,7 +2342,7 @@
           <a:p>
             <a:fld id="{1D8BD707-D9CF-40AE-B4C6-C98DA3205C09}" type="datetimeFigureOut">
               <a:rPr lang="en-US"/>
-              <a:t>11/21/23</a:t>
+              <a:t>7/29/24</a:t>
             </a:fld>
             <a:endParaRPr lang="en-US"/>
           </a:p>
@@ -2520,7 +2520,7 @@
           <a:p>
             <a:fld id="{1D8BD707-D9CF-40AE-B4C6-C98DA3205C09}" type="datetimeFigureOut">
               <a:rPr lang="en-US"/>
-              <a:t>11/21/23</a:t>
+              <a:t>7/29/24</a:t>
             </a:fld>
             <a:endParaRPr lang="en-US"/>
           </a:p>
@@ -2639,7 +2639,7 @@
           <a:p>
             <a:fld id="{1D8BD707-D9CF-40AE-B4C6-C98DA3205C09}" type="datetimeFigureOut">
               <a:rPr lang="en-US"/>
-              <a:t>11/21/23</a:t>
+              <a:t>7/29/24</a:t>
             </a:fld>
             <a:endParaRPr lang="en-US"/>
           </a:p>
@@ -5340,7 +5340,7 @@
           <a:p>
             <a:fld id="{1D8BD707-D9CF-40AE-B4C6-C98DA3205C09}" type="datetimeFigureOut">
               <a:rPr lang="en-US"/>
-              <a:t>11/21/23</a:t>
+              <a:t>7/29/24</a:t>
             </a:fld>
             <a:endParaRPr lang="en-US"/>
           </a:p>
@@ -15096,19 +15096,11 @@
             </a:pPr>
             <a:r>
               <a:rPr lang="ru-RU" dirty="0"/>
-              <a:t>Приходите на следующие </a:t>
-            </a:r>
-            <a:r>
-              <a:rPr lang="ru-RU" dirty="0" err="1"/>
-              <a:t>вебинары</a:t>
+              <a:t>Приходите на следующие вебинары</a:t>
             </a:r>
             <a:br>
               <a:rPr lang="ru-RU" dirty="0"/>
             </a:br>
-            <a:r>
-              <a:rPr lang="en-US" sz="1800" dirty="0"/>
-              <a:t>29.11 – </a:t>
-            </a:r>
             <a:r>
               <a:rPr lang="ru-RU" sz="1800" dirty="0"/>
               <a:t>Библиотека </a:t>

</xml_diff>